<commit_message>
update demos, upgrade slides
</commit_message>
<xml_diff>
--- a/slides/week-4.pptx
+++ b/slides/week-4.pptx
@@ -201,10 +201,6 @@
 </p:presentation>
 </file>
 
-<file path=ppt/revisionInfo.xml><?xml version="1.0" encoding="utf-8"?>
-<p1510:revInfo xmlns:a="http://schemas.openxmlformats.org/drawingml/2006/main" xmlns:r="http://schemas.openxmlformats.org/officeDocument/2006/relationships" xmlns:p1510="http://schemas.microsoft.com/office/powerpoint/2015/10/main"/>
-</file>
-
 <file path=ppt/slideLayouts/slideLayout1.xml><?xml version="1.0" encoding="utf-8"?>
 <p:sldLayout xmlns:a="http://schemas.openxmlformats.org/drawingml/2006/main" xmlns:r="http://schemas.openxmlformats.org/officeDocument/2006/relationships" xmlns:p="http://schemas.openxmlformats.org/presentationml/2006/main" type="obj" preserve="1">
   <p:cSld name="Title Slide">
@@ -344,7 +340,7 @@
           <a:p>
             <a:fld id="{1D8BD707-D9CF-40AE-B4C6-C98DA3205C09}" type="datetimeFigureOut">
               <a:rPr lang="en-US"/>
-              <a:t>12/4/2017</a:t>
+              <a:t>2/1/18</a:t>
             </a:fld>
             <a:endParaRPr lang="en-US"/>
           </a:p>
@@ -585,7 +581,7 @@
           <a:p>
             <a:fld id="{1D8BD707-D9CF-40AE-B4C6-C98DA3205C09}" type="datetimeFigureOut">
               <a:rPr lang="en-US"/>
-              <a:t>12/4/2017</a:t>
+              <a:t>2/1/18</a:t>
             </a:fld>
             <a:endParaRPr lang="en-US"/>
           </a:p>
@@ -805,7 +801,7 @@
           <a:p>
             <a:fld id="{1D8BD707-D9CF-40AE-B4C6-C98DA3205C09}" type="datetimeFigureOut">
               <a:rPr lang="en-US"/>
-              <a:t>12/4/2017</a:t>
+              <a:t>2/1/18</a:t>
             </a:fld>
             <a:endParaRPr lang="en-US"/>
           </a:p>
@@ -1017,7 +1013,7 @@
           <a:p>
             <a:fld id="{1D8BD707-D9CF-40AE-B4C6-C98DA3205C09}" type="datetimeFigureOut">
               <a:rPr lang="en-US"/>
-              <a:t>12/4/2017</a:t>
+              <a:t>2/1/18</a:t>
             </a:fld>
             <a:endParaRPr lang="en-US"/>
           </a:p>
@@ -1200,7 +1196,7 @@
           <a:p>
             <a:fld id="{1D8BD707-D9CF-40AE-B4C6-C98DA3205C09}" type="datetimeFigureOut">
               <a:rPr lang="en-US"/>
-              <a:t>12/4/2017</a:t>
+              <a:t>2/1/18</a:t>
             </a:fld>
             <a:endParaRPr lang="en-US"/>
           </a:p>
@@ -1431,7 +1427,7 @@
           <a:p>
             <a:fld id="{1D8BD707-D9CF-40AE-B4C6-C98DA3205C09}" type="datetimeFigureOut">
               <a:rPr lang="en-US"/>
-              <a:t>12/4/2017</a:t>
+              <a:t>2/1/18</a:t>
             </a:fld>
             <a:endParaRPr lang="en-US"/>
           </a:p>
@@ -1962,7 +1958,7 @@
         <p:spPr>
           <a:xfrm>
             <a:off x="4123690" y="8215481"/>
-            <a:ext cx="4808220" cy="1034579"/>
+            <a:ext cx="4808220" cy="1104277"/>
           </a:xfrm>
           <a:prstGeom prst="rect">
             <a:avLst/>
@@ -1997,7 +1993,7 @@
                 <a:latin typeface="Georgia" panose="02040502050405020303" pitchFamily="18" charset="0"/>
                 <a:cs typeface="Lora"/>
               </a:rPr>
-              <a:t>Beck Johnson</a:t>
+              <a:t>Aaron Bronow</a:t>
             </a:r>
           </a:p>
           <a:p>
@@ -12956,15 +12952,21 @@
           <p:nvPr/>
         </p:nvPicPr>
         <p:blipFill>
-          <a:blip r:embed="rId2"/>
+          <a:blip r:embed="rId2">
+            <a:extLst>
+              <a:ext uri="{28A0092B-C50C-407E-A947-70E740481C1C}">
+                <a14:useLocalDpi xmlns:a14="http://schemas.microsoft.com/office/drawing/2010/main" val="0"/>
+              </a:ext>
+            </a:extLst>
+          </a:blip>
           <a:stretch>
             <a:fillRect/>
           </a:stretch>
         </p:blipFill>
         <p:spPr>
           <a:xfrm>
-            <a:off x="1138735" y="3937712"/>
-            <a:ext cx="10670001" cy="2982458"/>
+            <a:off x="2685411" y="3937712"/>
+            <a:ext cx="7576648" cy="2982458"/>
           </a:xfrm>
           <a:prstGeom prst="rect">
             <a:avLst/>
@@ -13173,7 +13175,7 @@
         <p:spPr>
           <a:xfrm>
             <a:off x="2849620" y="7214519"/>
-            <a:ext cx="6934200" cy="1938992"/>
+            <a:ext cx="7538980" cy="1938992"/>
           </a:xfrm>
           <a:prstGeom prst="rect">
             <a:avLst/>
@@ -13286,7 +13288,27 @@
                 <a:latin typeface="Consolas"/>
                 <a:cs typeface="Consolas"/>
               </a:rPr>
-              <a:t>="beck.png" /&gt;</a:t>
+              <a:t>="</a:t>
+            </a:r>
+            <a:r>
+              <a:rPr lang="en-US" sz="2400" dirty="0" err="1">
+                <a:solidFill>
+                  <a:srgbClr val="0000FF"/>
+                </a:solidFill>
+                <a:latin typeface="Consolas"/>
+                <a:cs typeface="Consolas"/>
+              </a:rPr>
+              <a:t>aaron.gif</a:t>
+            </a:r>
+            <a:r>
+              <a:rPr lang="en-US" sz="2400" dirty="0">
+                <a:solidFill>
+                  <a:srgbClr val="0000FF"/>
+                </a:solidFill>
+                <a:latin typeface="Consolas"/>
+                <a:cs typeface="Consolas"/>
+              </a:rPr>
+              <a:t>" /&gt;</a:t>
             </a:r>
           </a:p>
           <a:p>
@@ -13302,7 +13324,7 @@
               <a:t>&lt;</a:t>
             </a:r>
             <a:r>
-              <a:rPr lang="en-US" sz="2400" dirty="0" err="1">
+              <a:rPr lang="en-US" sz="2400" dirty="0">
                 <a:solidFill>
                   <a:srgbClr val="7F007F"/>
                 </a:solidFill>
@@ -13333,10 +13355,10 @@
                 <a:latin typeface="Consolas"/>
                 <a:cs typeface="Consolas"/>
               </a:rPr>
-              <a:t>="bio"&gt;By Beck Johnson&lt;/</a:t>
-            </a:r>
-            <a:r>
-              <a:rPr lang="en-US" sz="2400" dirty="0" err="1">
+              <a:t>="bio"&gt;By Aaron Bronow&lt;/</a:t>
+            </a:r>
+            <a:r>
+              <a:rPr lang="en-US" sz="2400" dirty="0">
                 <a:solidFill>
                   <a:srgbClr val="7F007F"/>
                 </a:solidFill>
@@ -13400,7 +13422,7 @@
                 <a:latin typeface="Consolas"/>
                 <a:cs typeface="Consolas"/>
               </a:rPr>
-              <a:t>="bio"&gt;Beck Johnson is… &lt;/</a:t>
+              <a:t>="bio"&gt;Aaron Bronow is… &lt;/</a:t>
             </a:r>
             <a:r>
               <a:rPr lang="en-US" sz="2400" dirty="0">
@@ -13677,15 +13699,21 @@
           <p:nvPr/>
         </p:nvPicPr>
         <p:blipFill>
-          <a:blip r:embed="rId2"/>
+          <a:blip r:embed="rId2">
+            <a:extLst>
+              <a:ext uri="{28A0092B-C50C-407E-A947-70E740481C1C}">
+                <a14:useLocalDpi xmlns:a14="http://schemas.microsoft.com/office/drawing/2010/main" val="0"/>
+              </a:ext>
+            </a:extLst>
+          </a:blip>
           <a:stretch>
             <a:fillRect/>
           </a:stretch>
         </p:blipFill>
         <p:spPr>
           <a:xfrm>
-            <a:off x="3630742" y="2533613"/>
-            <a:ext cx="6200864" cy="1894708"/>
+            <a:off x="4324512" y="2533613"/>
+            <a:ext cx="4813323" cy="1894708"/>
           </a:xfrm>
           <a:prstGeom prst="rect">
             <a:avLst/>
@@ -13820,24 +13848,34 @@
               <a:t> </a:t>
             </a:r>
             <a:r>
+              <a:rPr lang="en-US" sz="2800" strike="sngStrike" dirty="0">
+                <a:solidFill>
+                  <a:srgbClr val="FF0000"/>
+                </a:solidFill>
+                <a:latin typeface="Consolas"/>
+                <a:cs typeface="Consolas"/>
+              </a:rPr>
+              <a:t>float</a:t>
+            </a:r>
+            <a:r>
+              <a:rPr lang="en-US" sz="2800" strike="sngStrike" dirty="0">
+                <a:solidFill>
+                  <a:srgbClr val="0000FF"/>
+                </a:solidFill>
+                <a:latin typeface="Consolas"/>
+                <a:cs typeface="Consolas"/>
+              </a:rPr>
+              <a:t>: right;</a:t>
+            </a:r>
+            <a:r>
               <a:rPr lang="en-US" sz="2800" dirty="0">
                 <a:solidFill>
-                  <a:srgbClr val="FF0000"/>
-                </a:solidFill>
-                <a:latin typeface="Consolas"/>
-                <a:cs typeface="Consolas"/>
-              </a:rPr>
-              <a:t>float</a:t>
-            </a:r>
-            <a:r>
-              <a:rPr lang="en-US" sz="2800" dirty="0">
-                <a:solidFill>
                   <a:srgbClr val="0000FF"/>
                 </a:solidFill>
                 <a:latin typeface="Consolas"/>
                 <a:cs typeface="Consolas"/>
               </a:rPr>
-              <a:t>: right; }</a:t>
+              <a:t> }</a:t>
             </a:r>
           </a:p>
         </p:txBody>
@@ -14044,7 +14082,7 @@
 </file>
 
 <file path=ppt/slides/slide39.xml><?xml version="1.0" encoding="utf-8"?>
-<p:sld xmlns:a="http://schemas.openxmlformats.org/drawingml/2006/main" xmlns:r="http://schemas.openxmlformats.org/officeDocument/2006/relationships" xmlns:p="http://schemas.openxmlformats.org/presentationml/2006/main">
+<p:sld xmlns:a="http://schemas.openxmlformats.org/drawingml/2006/main" xmlns:r="http://schemas.openxmlformats.org/officeDocument/2006/relationships" xmlns:p="http://schemas.openxmlformats.org/presentationml/2006/main" show="0">
   <p:cSld>
     <p:spTree>
       <p:nvGrpSpPr>
@@ -15712,7 +15750,7 @@
         <p:spPr>
           <a:xfrm>
             <a:off x="1762510" y="3276600"/>
-            <a:ext cx="9479779" cy="3447098"/>
+            <a:ext cx="9479779" cy="4924425"/>
           </a:xfrm>
           <a:prstGeom prst="rect">
             <a:avLst/>
@@ -15733,7 +15771,7 @@
                 <a:latin typeface="Georgia" panose="02040502050405020303" pitchFamily="18" charset="0"/>
                 <a:cs typeface="Lora"/>
               </a:rPr>
-              <a:t>There are 2 ways to fix this:</a:t>
+              <a:t>There are 3 ways to fix this:</a:t>
             </a:r>
           </a:p>
           <a:p>
@@ -15879,6 +15917,35 @@
                 <a:cs typeface="Lora"/>
               </a:rPr>
               <a:t>container</a:t>
+            </a:r>
+          </a:p>
+          <a:p>
+            <a:pPr marL="527050" indent="-514350">
+              <a:buFont typeface="+mj-lt"/>
+              <a:buAutoNum type="arabicPeriod"/>
+            </a:pPr>
+            <a:endParaRPr lang="en-US" sz="3200" b="1" spc="-15" dirty="0">
+              <a:solidFill>
+                <a:srgbClr val="5F5F5F"/>
+              </a:solidFill>
+              <a:latin typeface="Georgia" panose="02040502050405020303" pitchFamily="18" charset="0"/>
+              <a:cs typeface="Lora"/>
+            </a:endParaRPr>
+          </a:p>
+          <a:p>
+            <a:pPr marL="527050" indent="-514350">
+              <a:buFont typeface="+mj-lt"/>
+              <a:buAutoNum type="arabicPeriod"/>
+            </a:pPr>
+            <a:r>
+              <a:rPr lang="en-US" sz="3200" spc="-15" dirty="0">
+                <a:solidFill>
+                  <a:srgbClr val="5F5F5F"/>
+                </a:solidFill>
+                <a:latin typeface="Georgia" panose="02040502050405020303" pitchFamily="18" charset="0"/>
+                <a:cs typeface="Lora"/>
+              </a:rPr>
+              <a:t>Make sure content after the floated element is long enough </a:t>
             </a:r>
             <a:endParaRPr lang="en-US" sz="3100" spc="-15" dirty="0">
               <a:solidFill>
@@ -17686,7 +17753,7 @@
         <p:spPr>
           <a:xfrm>
             <a:off x="1305310" y="2590800"/>
-            <a:ext cx="10394179" cy="6294031"/>
+            <a:ext cx="10394179" cy="4832092"/>
           </a:xfrm>
           <a:prstGeom prst="rect">
             <a:avLst/>
@@ -17728,6 +17795,109 @@
                 <a:cs typeface="Lora"/>
               </a:rPr>
               <a:t> after the bio container:</a:t>
+            </a:r>
+          </a:p>
+          <a:p>
+            <a:pPr marL="12700"/>
+            <a:endParaRPr lang="en-US" sz="3200" dirty="0">
+              <a:solidFill>
+                <a:srgbClr val="0000FF"/>
+              </a:solidFill>
+              <a:latin typeface="Consolas"/>
+              <a:cs typeface="Consolas"/>
+            </a:endParaRPr>
+          </a:p>
+          <a:p>
+            <a:pPr marL="12700"/>
+            <a:endParaRPr lang="en-US" sz="3200" dirty="0">
+              <a:solidFill>
+                <a:srgbClr val="0000FF"/>
+              </a:solidFill>
+              <a:latin typeface="Consolas"/>
+              <a:cs typeface="Consolas"/>
+            </a:endParaRPr>
+          </a:p>
+          <a:p>
+            <a:pPr marL="12700"/>
+            <a:endParaRPr lang="en-US" sz="3200" dirty="0">
+              <a:solidFill>
+                <a:srgbClr val="0000FF"/>
+              </a:solidFill>
+              <a:latin typeface="Consolas"/>
+              <a:cs typeface="Consolas"/>
+            </a:endParaRPr>
+          </a:p>
+          <a:p>
+            <a:pPr marL="12700"/>
+            <a:r>
+              <a:rPr lang="en-US" sz="3200" dirty="0">
+                <a:solidFill>
+                  <a:srgbClr val="0000FF"/>
+                </a:solidFill>
+                <a:latin typeface="Consolas"/>
+                <a:cs typeface="Consolas"/>
+              </a:rPr>
+              <a:t>&lt;</a:t>
+            </a:r>
+            <a:r>
+              <a:rPr lang="en-US" sz="3200" dirty="0">
+                <a:solidFill>
+                  <a:srgbClr val="7F007F"/>
+                </a:solidFill>
+                <a:latin typeface="Consolas"/>
+                <a:cs typeface="Consolas"/>
+              </a:rPr>
+              <a:t>div</a:t>
+            </a:r>
+            <a:r>
+              <a:rPr lang="en-US" sz="3200" dirty="0">
+                <a:solidFill>
+                  <a:srgbClr val="0000FF"/>
+                </a:solidFill>
+                <a:latin typeface="Consolas"/>
+                <a:cs typeface="Consolas"/>
+              </a:rPr>
+              <a:t> </a:t>
+            </a:r>
+            <a:r>
+              <a:rPr lang="en-US" sz="3200" dirty="0">
+                <a:solidFill>
+                  <a:srgbClr val="FF0000"/>
+                </a:solidFill>
+                <a:latin typeface="Consolas"/>
+                <a:cs typeface="Consolas"/>
+              </a:rPr>
+              <a:t>style</a:t>
+            </a:r>
+            <a:r>
+              <a:rPr lang="en-US" sz="3200" dirty="0">
+                <a:solidFill>
+                  <a:srgbClr val="0000FF"/>
+                </a:solidFill>
+                <a:latin typeface="Consolas"/>
+                <a:cs typeface="Consolas"/>
+              </a:rPr>
+              <a:t>="clear: both"&gt;&lt;/</a:t>
+            </a:r>
+            <a:r>
+              <a:rPr lang="en-US" sz="3200" dirty="0">
+                <a:solidFill>
+                  <a:srgbClr val="7F007F"/>
+                </a:solidFill>
+                <a:latin typeface="Consolas"/>
+                <a:cs typeface="Consolas"/>
+              </a:rPr>
+              <a:t>div</a:t>
+            </a:r>
+            <a:r>
+              <a:rPr lang="en-US" sz="3200" dirty="0">
+                <a:solidFill>
+                  <a:srgbClr val="0000FF"/>
+                </a:solidFill>
+                <a:latin typeface="Consolas"/>
+                <a:cs typeface="Consolas"/>
+              </a:rPr>
+              <a:t>&gt;</a:t>
             </a:r>
           </a:p>
           <a:p>
@@ -17742,129 +17912,6 @@
           </a:p>
           <a:p>
             <a:pPr marL="12700"/>
-            <a:endParaRPr lang="en-US" sz="3200" dirty="0">
-              <a:solidFill>
-                <a:srgbClr val="0000FF"/>
-              </a:solidFill>
-              <a:latin typeface="Consolas"/>
-              <a:cs typeface="Consolas"/>
-            </a:endParaRPr>
-          </a:p>
-          <a:p>
-            <a:pPr marL="12700"/>
-            <a:endParaRPr lang="en-US" sz="3200" dirty="0">
-              <a:solidFill>
-                <a:srgbClr val="0000FF"/>
-              </a:solidFill>
-              <a:latin typeface="Consolas"/>
-              <a:cs typeface="Consolas"/>
-            </a:endParaRPr>
-          </a:p>
-          <a:p>
-            <a:pPr marL="12700"/>
-            <a:endParaRPr lang="en-US" sz="3200" dirty="0">
-              <a:solidFill>
-                <a:srgbClr val="0000FF"/>
-              </a:solidFill>
-              <a:latin typeface="Consolas"/>
-              <a:cs typeface="Consolas"/>
-            </a:endParaRPr>
-          </a:p>
-          <a:p>
-            <a:pPr marL="12700"/>
-            <a:endParaRPr lang="en-US" sz="3200" dirty="0">
-              <a:solidFill>
-                <a:srgbClr val="0000FF"/>
-              </a:solidFill>
-              <a:latin typeface="Consolas"/>
-              <a:cs typeface="Consolas"/>
-            </a:endParaRPr>
-          </a:p>
-          <a:p>
-            <a:pPr marL="12700"/>
-            <a:endParaRPr lang="en-US" sz="3200" dirty="0">
-              <a:solidFill>
-                <a:srgbClr val="0000FF"/>
-              </a:solidFill>
-              <a:latin typeface="Consolas"/>
-              <a:cs typeface="Consolas"/>
-            </a:endParaRPr>
-          </a:p>
-          <a:p>
-            <a:pPr marL="12700"/>
-            <a:r>
-              <a:rPr lang="en-US" sz="3200" dirty="0">
-                <a:solidFill>
-                  <a:srgbClr val="0000FF"/>
-                </a:solidFill>
-                <a:latin typeface="Consolas"/>
-                <a:cs typeface="Consolas"/>
-              </a:rPr>
-              <a:t>&lt;</a:t>
-            </a:r>
-            <a:r>
-              <a:rPr lang="en-US" sz="3200" dirty="0">
-                <a:solidFill>
-                  <a:srgbClr val="7F007F"/>
-                </a:solidFill>
-                <a:latin typeface="Consolas"/>
-                <a:cs typeface="Consolas"/>
-              </a:rPr>
-              <a:t>div</a:t>
-            </a:r>
-            <a:r>
-              <a:rPr lang="en-US" sz="3200" dirty="0">
-                <a:solidFill>
-                  <a:srgbClr val="0000FF"/>
-                </a:solidFill>
-                <a:latin typeface="Consolas"/>
-                <a:cs typeface="Consolas"/>
-              </a:rPr>
-              <a:t> </a:t>
-            </a:r>
-            <a:r>
-              <a:rPr lang="en-US" sz="3200" dirty="0">
-                <a:solidFill>
-                  <a:srgbClr val="FF0000"/>
-                </a:solidFill>
-                <a:latin typeface="Consolas"/>
-                <a:cs typeface="Consolas"/>
-              </a:rPr>
-              <a:t>style</a:t>
-            </a:r>
-            <a:r>
-              <a:rPr lang="en-US" sz="3200" dirty="0">
-                <a:solidFill>
-                  <a:srgbClr val="0000FF"/>
-                </a:solidFill>
-                <a:latin typeface="Consolas"/>
-                <a:cs typeface="Consolas"/>
-              </a:rPr>
-              <a:t>="clear: both"&gt;&lt;/</a:t>
-            </a:r>
-            <a:r>
-              <a:rPr lang="en-US" sz="3200" dirty="0">
-                <a:solidFill>
-                  <a:srgbClr val="7F007F"/>
-                </a:solidFill>
-                <a:latin typeface="Consolas"/>
-                <a:cs typeface="Consolas"/>
-              </a:rPr>
-              <a:t>div</a:t>
-            </a:r>
-            <a:r>
-              <a:rPr lang="en-US" sz="3200" dirty="0">
-                <a:solidFill>
-                  <a:srgbClr val="0000FF"/>
-                </a:solidFill>
-                <a:latin typeface="Consolas"/>
-                <a:cs typeface="Consolas"/>
-              </a:rPr>
-              <a:t>&gt;</a:t>
-            </a:r>
-          </a:p>
-          <a:p>
-            <a:pPr marL="12700"/>
             <a:endParaRPr lang="en-US" sz="3100" spc="-15" dirty="0">
               <a:solidFill>
                 <a:srgbClr val="5F5F5F"/>
@@ -17875,16 +17922,6 @@
           </a:p>
           <a:p>
             <a:pPr marL="12700"/>
-            <a:endParaRPr lang="en-US" sz="3100" spc="-15" dirty="0">
-              <a:solidFill>
-                <a:srgbClr val="5F5F5F"/>
-              </a:solidFill>
-              <a:latin typeface="Georgia" panose="02040502050405020303" pitchFamily="18" charset="0"/>
-              <a:cs typeface="Lora"/>
-            </a:endParaRPr>
-          </a:p>
-          <a:p>
-            <a:pPr marL="12700"/>
             <a:r>
               <a:rPr lang="en-US" sz="3100" spc="-15" dirty="0">
                 <a:solidFill>
@@ -17898,30 +17935,6 @@
           </a:p>
         </p:txBody>
       </p:sp>
-      <p:pic>
-        <p:nvPicPr>
-          <p:cNvPr id="5" name="Picture 4"/>
-          <p:cNvPicPr>
-            <a:picLocks noChangeAspect="1"/>
-          </p:cNvPicPr>
-          <p:nvPr/>
-        </p:nvPicPr>
-        <p:blipFill>
-          <a:blip r:embed="rId2"/>
-          <a:stretch>
-            <a:fillRect/>
-          </a:stretch>
-        </p:blipFill>
-        <p:spPr>
-          <a:xfrm>
-            <a:off x="1397000" y="4114800"/>
-            <a:ext cx="6994795" cy="1703751"/>
-          </a:xfrm>
-          <a:prstGeom prst="rect">
-            <a:avLst/>
-          </a:prstGeom>
-        </p:spPr>
-      </p:pic>
       <p:sp>
         <p:nvSpPr>
           <p:cNvPr id="7" name="object 2">
@@ -18060,7 +18073,7 @@
             <a:avLst/>
           </a:prstGeom>
           <a:blipFill>
-            <a:blip r:embed="rId3" cstate="print"/>
+            <a:blip r:embed="rId2" cstate="print"/>
             <a:stretch>
               <a:fillRect/>
             </a:stretch>

</xml_diff>